<commit_message>
[DOCS] Updated architectural chart
</commit_message>
<xml_diff>
--- a/doc/Development_Documentation/img/architectural-chart.pptx
+++ b/doc/Development_Documentation/img/architectural-chart.pptx
@@ -112,6 +112,10 @@
 </p:presentation>
 </file>
 
+<file path=ppt/revisionInfo.xml><?xml version="1.0" encoding="utf-8"?>
+<p1510:revInfo xmlns:a="http://schemas.openxmlformats.org/drawingml/2006/main" xmlns:r="http://schemas.openxmlformats.org/officeDocument/2006/relationships" xmlns:p1510="http://schemas.microsoft.com/office/powerpoint/2015/10/main"/>
+</file>
+
 <file path=ppt/slideLayouts/slideLayout1.xml><?xml version="1.0" encoding="utf-8"?>
 <p:sldLayout xmlns:a="http://schemas.openxmlformats.org/drawingml/2006/main" xmlns:r="http://schemas.openxmlformats.org/officeDocument/2006/relationships" xmlns:p="http://schemas.openxmlformats.org/presentationml/2006/main" type="title" preserve="1">
   <p:cSld name="Titelfolie">
@@ -241,7 +245,7 @@
           <a:p>
             <a:fld id="{F4618184-AC6B-4EC8-A593-7F91D186A496}" type="datetimeFigureOut">
               <a:rPr lang="de-DE" smtClean="0"/>
-              <a:t>11.04.2017</a:t>
+              <a:t>02.06.2017</a:t>
             </a:fld>
             <a:endParaRPr lang="de-DE"/>
           </a:p>
@@ -409,7 +413,7 @@
           <a:p>
             <a:fld id="{F4618184-AC6B-4EC8-A593-7F91D186A496}" type="datetimeFigureOut">
               <a:rPr lang="de-DE" smtClean="0"/>
-              <a:t>11.04.2017</a:t>
+              <a:t>02.06.2017</a:t>
             </a:fld>
             <a:endParaRPr lang="de-DE"/>
           </a:p>
@@ -587,7 +591,7 @@
           <a:p>
             <a:fld id="{F4618184-AC6B-4EC8-A593-7F91D186A496}" type="datetimeFigureOut">
               <a:rPr lang="de-DE" smtClean="0"/>
-              <a:t>11.04.2017</a:t>
+              <a:t>02.06.2017</a:t>
             </a:fld>
             <a:endParaRPr lang="de-DE"/>
           </a:p>
@@ -755,7 +759,7 @@
           <a:p>
             <a:fld id="{F4618184-AC6B-4EC8-A593-7F91D186A496}" type="datetimeFigureOut">
               <a:rPr lang="de-DE" smtClean="0"/>
-              <a:t>11.04.2017</a:t>
+              <a:t>02.06.2017</a:t>
             </a:fld>
             <a:endParaRPr lang="de-DE"/>
           </a:p>
@@ -1000,7 +1004,7 @@
           <a:p>
             <a:fld id="{F4618184-AC6B-4EC8-A593-7F91D186A496}" type="datetimeFigureOut">
               <a:rPr lang="de-DE" smtClean="0"/>
-              <a:t>11.04.2017</a:t>
+              <a:t>02.06.2017</a:t>
             </a:fld>
             <a:endParaRPr lang="de-DE"/>
           </a:p>
@@ -1229,7 +1233,7 @@
           <a:p>
             <a:fld id="{F4618184-AC6B-4EC8-A593-7F91D186A496}" type="datetimeFigureOut">
               <a:rPr lang="de-DE" smtClean="0"/>
-              <a:t>11.04.2017</a:t>
+              <a:t>02.06.2017</a:t>
             </a:fld>
             <a:endParaRPr lang="de-DE"/>
           </a:p>
@@ -1593,7 +1597,7 @@
           <a:p>
             <a:fld id="{F4618184-AC6B-4EC8-A593-7F91D186A496}" type="datetimeFigureOut">
               <a:rPr lang="de-DE" smtClean="0"/>
-              <a:t>11.04.2017</a:t>
+              <a:t>02.06.2017</a:t>
             </a:fld>
             <a:endParaRPr lang="de-DE"/>
           </a:p>
@@ -1710,7 +1714,7 @@
           <a:p>
             <a:fld id="{F4618184-AC6B-4EC8-A593-7F91D186A496}" type="datetimeFigureOut">
               <a:rPr lang="de-DE" smtClean="0"/>
-              <a:t>11.04.2017</a:t>
+              <a:t>02.06.2017</a:t>
             </a:fld>
             <a:endParaRPr lang="de-DE"/>
           </a:p>
@@ -1805,7 +1809,7 @@
           <a:p>
             <a:fld id="{F4618184-AC6B-4EC8-A593-7F91D186A496}" type="datetimeFigureOut">
               <a:rPr lang="de-DE" smtClean="0"/>
-              <a:t>11.04.2017</a:t>
+              <a:t>02.06.2017</a:t>
             </a:fld>
             <a:endParaRPr lang="de-DE"/>
           </a:p>
@@ -2080,7 +2084,7 @@
           <a:p>
             <a:fld id="{F4618184-AC6B-4EC8-A593-7F91D186A496}" type="datetimeFigureOut">
               <a:rPr lang="de-DE" smtClean="0"/>
-              <a:t>11.04.2017</a:t>
+              <a:t>02.06.2017</a:t>
             </a:fld>
             <a:endParaRPr lang="de-DE"/>
           </a:p>
@@ -2332,7 +2336,7 @@
           <a:p>
             <a:fld id="{F4618184-AC6B-4EC8-A593-7F91D186A496}" type="datetimeFigureOut">
               <a:rPr lang="de-DE" smtClean="0"/>
-              <a:t>11.04.2017</a:t>
+              <a:t>02.06.2017</a:t>
             </a:fld>
             <a:endParaRPr lang="de-DE"/>
           </a:p>
@@ -2543,7 +2547,7 @@
           <a:p>
             <a:fld id="{F4618184-AC6B-4EC8-A593-7F91D186A496}" type="datetimeFigureOut">
               <a:rPr lang="de-DE" smtClean="0"/>
-              <a:t>11.04.2017</a:t>
+              <a:t>02.06.2017</a:t>
             </a:fld>
             <a:endParaRPr lang="de-DE"/>
           </a:p>
@@ -3212,7 +3216,7 @@
         </p:nvSpPr>
         <p:spPr>
           <a:xfrm>
-            <a:off x="4145520" y="5636964"/>
+            <a:off x="4048350" y="5630657"/>
             <a:ext cx="3600000" cy="876300"/>
           </a:xfrm>
           <a:prstGeom prst="roundRect">
@@ -3258,7 +3262,7 @@
         </p:nvSpPr>
         <p:spPr>
           <a:xfrm>
-            <a:off x="7957666" y="5636964"/>
+            <a:off x="7763326" y="5630657"/>
             <a:ext cx="3600000" cy="876300"/>
           </a:xfrm>
           <a:prstGeom prst="roundRect">
@@ -3305,12 +3309,10 @@
         <p:spPr>
           <a:xfrm>
             <a:off x="333376" y="3665288"/>
-            <a:ext cx="11224290" cy="1473157"/>
+            <a:ext cx="11029950" cy="1473157"/>
           </a:xfrm>
           <a:prstGeom prst="roundRect">
-            <a:avLst>
-              <a:gd name="adj" fmla="val 11269"/>
-            </a:avLst>
+            <a:avLst/>
           </a:prstGeom>
           <a:solidFill>
             <a:schemeClr val="accent1">
@@ -3346,22 +3348,14 @@
           <a:bodyPr vert="vert270" rtlCol="0" anchor="t" anchorCtr="1"/>
           <a:lstStyle/>
           <a:p>
-            <a:pPr algn="ctr">
-              <a:lnSpc>
-                <a:spcPct val="70000"/>
-              </a:lnSpc>
-            </a:pPr>
+            <a:pPr algn="ctr"/>
             <a:r>
               <a:rPr lang="de-DE" dirty="0"/>
               <a:t>Pimcore</a:t>
             </a:r>
           </a:p>
           <a:p>
-            <a:pPr algn="ctr">
-              <a:lnSpc>
-                <a:spcPct val="70000"/>
-              </a:lnSpc>
-            </a:pPr>
+            <a:pPr algn="ctr"/>
             <a:r>
               <a:rPr lang="de-DE" dirty="0"/>
               <a:t>Core</a:t>
@@ -3377,8 +3371,8 @@
         </p:nvSpPr>
         <p:spPr>
           <a:xfrm>
-            <a:off x="950206" y="3809668"/>
-            <a:ext cx="10413120" cy="266700"/>
+            <a:off x="1438793" y="3833521"/>
+            <a:ext cx="9734032" cy="266700"/>
           </a:xfrm>
           <a:prstGeom prst="roundRect">
             <a:avLst/>
@@ -3428,7 +3422,7 @@
         </p:nvSpPr>
         <p:spPr>
           <a:xfrm>
-            <a:off x="4147736" y="4491158"/>
+            <a:off x="4743967" y="4515476"/>
             <a:ext cx="1462088" cy="534865"/>
           </a:xfrm>
           <a:prstGeom prst="roundRect">
@@ -3471,7 +3465,7 @@
         </p:nvSpPr>
         <p:spPr>
           <a:xfrm>
-            <a:off x="2548971" y="4491158"/>
+            <a:off x="3094277" y="4515479"/>
             <a:ext cx="1462088" cy="534865"/>
           </a:xfrm>
           <a:prstGeom prst="roundRect">
@@ -3514,7 +3508,7 @@
         </p:nvSpPr>
         <p:spPr>
           <a:xfrm>
-            <a:off x="950206" y="4491157"/>
+            <a:off x="1438793" y="4515478"/>
             <a:ext cx="1462088" cy="534865"/>
           </a:xfrm>
           <a:prstGeom prst="roundRect">
@@ -3558,13 +3552,11 @@
         </p:nvSpPr>
         <p:spPr>
           <a:xfrm>
-            <a:off x="5746501" y="4159248"/>
-            <a:ext cx="1296000" cy="866775"/>
+            <a:off x="6399451" y="4183567"/>
+            <a:ext cx="1462088" cy="866775"/>
           </a:xfrm>
           <a:prstGeom prst="roundRect">
-            <a:avLst>
-              <a:gd name="adj" fmla="val 7494"/>
-            </a:avLst>
+            <a:avLst/>
           </a:prstGeom>
         </p:spPr>
         <p:style>
@@ -3589,10 +3581,97 @@
           <a:p>
             <a:pPr algn="ctr"/>
             <a:r>
-              <a:rPr lang="de-DE" sz="1600" dirty="0" err="1"/>
+              <a:rPr lang="de-DE" dirty="0" err="1"/>
               <a:t>Versioning</a:t>
             </a:r>
-            <a:endParaRPr lang="de-DE" sz="1600" dirty="0"/>
+            <a:endParaRPr lang="de-DE" dirty="0"/>
+          </a:p>
+        </p:txBody>
+      </p:sp>
+      <p:sp>
+        <p:nvSpPr>
+          <p:cNvPr id="19" name="Abgerundetes Rechteck 18"/>
+          <p:cNvSpPr/>
+          <p:nvPr/>
+        </p:nvSpPr>
+        <p:spPr>
+          <a:xfrm>
+            <a:off x="8049141" y="4188325"/>
+            <a:ext cx="1462088" cy="866775"/>
+          </a:xfrm>
+          <a:prstGeom prst="roundRect">
+            <a:avLst/>
+          </a:prstGeom>
+        </p:spPr>
+        <p:style>
+          <a:lnRef idx="2">
+            <a:schemeClr val="accent1">
+              <a:shade val="50000"/>
+            </a:schemeClr>
+          </a:lnRef>
+          <a:fillRef idx="1">
+            <a:schemeClr val="accent1"/>
+          </a:fillRef>
+          <a:effectRef idx="0">
+            <a:schemeClr val="accent1"/>
+          </a:effectRef>
+          <a:fontRef idx="minor">
+            <a:schemeClr val="lt1"/>
+          </a:fontRef>
+        </p:style>
+        <p:txBody>
+          <a:bodyPr rtlCol="0" anchor="ctr"/>
+          <a:lstStyle/>
+          <a:p>
+            <a:pPr algn="ctr"/>
+            <a:r>
+              <a:rPr lang="de-DE" dirty="0"/>
+              <a:t>Workflows</a:t>
+            </a:r>
+          </a:p>
+        </p:txBody>
+      </p:sp>
+      <p:sp>
+        <p:nvSpPr>
+          <p:cNvPr id="20" name="Abgerundetes Rechteck 19"/>
+          <p:cNvSpPr/>
+          <p:nvPr/>
+        </p:nvSpPr>
+        <p:spPr>
+          <a:xfrm>
+            <a:off x="9710737" y="4183566"/>
+            <a:ext cx="1462088" cy="866775"/>
+          </a:xfrm>
+          <a:prstGeom prst="roundRect">
+            <a:avLst/>
+          </a:prstGeom>
+        </p:spPr>
+        <p:style>
+          <a:lnRef idx="2">
+            <a:schemeClr val="accent1">
+              <a:shade val="50000"/>
+            </a:schemeClr>
+          </a:lnRef>
+          <a:fillRef idx="1">
+            <a:schemeClr val="accent1"/>
+          </a:fillRef>
+          <a:effectRef idx="0">
+            <a:schemeClr val="accent1"/>
+          </a:effectRef>
+          <a:fontRef idx="minor">
+            <a:schemeClr val="lt1"/>
+          </a:fontRef>
+        </p:style>
+        <p:txBody>
+          <a:bodyPr rtlCol="0" anchor="ctr"/>
+          <a:lstStyle/>
+          <a:p>
+            <a:pPr algn="ctr"/>
+            <a:r>
+              <a:rPr lang="de-DE" dirty="0" err="1"/>
+              <a:t>Scheduling</a:t>
+            </a:r>
+            <a:endParaRPr lang="de-DE" dirty="0"/>
           </a:p>
         </p:txBody>
       </p:sp>
@@ -3661,13 +3740,15 @@
       <p:cxnSp>
         <p:nvCxnSpPr>
           <p:cNvPr id="3" name="Gerade Verbindung mit Pfeil 2"/>
-          <p:cNvCxnSpPr/>
+          <p:cNvCxnSpPr>
+            <a:stCxn id="10" idx="0"/>
+          </p:cNvCxnSpPr>
           <p:nvPr/>
         </p:nvCxnSpPr>
         <p:spPr>
           <a:xfrm flipV="1">
             <a:off x="2133374" y="5133690"/>
-            <a:ext cx="0" cy="503274"/>
+            <a:ext cx="12667" cy="503274"/>
           </a:xfrm>
           <a:prstGeom prst="straightConnector1">
             <a:avLst/>
@@ -3700,13 +3781,15 @@
       <p:cxnSp>
         <p:nvCxnSpPr>
           <p:cNvPr id="22" name="Gerade Verbindung mit Pfeil 21"/>
-          <p:cNvCxnSpPr/>
+          <p:cNvCxnSpPr>
+            <a:stCxn id="11" idx="0"/>
+          </p:cNvCxnSpPr>
           <p:nvPr/>
         </p:nvCxnSpPr>
         <p:spPr>
           <a:xfrm flipV="1">
-            <a:off x="5945520" y="5138445"/>
-            <a:ext cx="1" cy="498519"/>
+            <a:off x="5848350" y="5138877"/>
+            <a:ext cx="12667" cy="491780"/>
           </a:xfrm>
           <a:prstGeom prst="straightConnector1">
             <a:avLst/>
@@ -3744,8 +3827,8 @@
         </p:nvCxnSpPr>
         <p:spPr>
           <a:xfrm flipV="1">
-            <a:off x="9757666" y="5136564"/>
-            <a:ext cx="0" cy="500400"/>
+            <a:off x="9550659" y="5127383"/>
+            <a:ext cx="12667" cy="503274"/>
           </a:xfrm>
           <a:prstGeom prst="straightConnector1">
             <a:avLst/>
@@ -3787,9 +3870,7 @@
             <a:ext cx="5514976" cy="1606285"/>
           </a:xfrm>
           <a:prstGeom prst="roundRect">
-            <a:avLst>
-              <a:gd name="adj" fmla="val 9242"/>
-            </a:avLst>
+            <a:avLst/>
           </a:prstGeom>
           <a:solidFill>
             <a:schemeClr val="accent1">
@@ -3941,7 +4022,7 @@
         <p:spPr>
           <a:xfrm>
             <a:off x="6382910" y="2255099"/>
-            <a:ext cx="5174756" cy="979714"/>
+            <a:ext cx="4980415" cy="979714"/>
           </a:xfrm>
           <a:prstGeom prst="roundRect">
             <a:avLst/>
@@ -3975,12 +4056,8 @@
           <a:p>
             <a:pPr algn="ctr"/>
             <a:r>
-              <a:rPr lang="de-DE" dirty="0" err="1"/>
-              <a:t>Plugins</a:t>
-            </a:r>
-            <a:r>
               <a:rPr lang="de-DE" dirty="0"/>
-              <a:t>, Composer, Custom Modules </a:t>
+              <a:t>Bundles, Composer, Custom Modules </a:t>
             </a:r>
           </a:p>
         </p:txBody>
@@ -4079,8 +4156,8 @@
         </p:nvSpPr>
         <p:spPr>
           <a:xfrm>
-            <a:off x="6690297" y="737125"/>
-            <a:ext cx="2340000" cy="1017021"/>
+            <a:off x="6690298" y="737125"/>
+            <a:ext cx="2043155" cy="1017021"/>
           </a:xfrm>
           <a:prstGeom prst="roundRect">
             <a:avLst/>
@@ -4127,8 +4204,8 @@
         </p:nvSpPr>
         <p:spPr>
           <a:xfrm>
-            <a:off x="9217666" y="733941"/>
-            <a:ext cx="2340000" cy="1017021"/>
+            <a:off x="8873662" y="732867"/>
+            <a:ext cx="2684004" cy="1017021"/>
           </a:xfrm>
           <a:prstGeom prst="roundRect">
             <a:avLst/>
@@ -4170,8 +4247,8 @@
         </p:nvCxnSpPr>
         <p:spPr>
           <a:xfrm flipV="1">
-            <a:off x="1640779" y="1310409"/>
-            <a:ext cx="0" cy="316800"/>
+            <a:off x="1640779" y="1324485"/>
+            <a:ext cx="6333" cy="305475"/>
           </a:xfrm>
           <a:prstGeom prst="straightConnector1">
             <a:avLst/>
@@ -4209,8 +4286,8 @@
         </p:nvCxnSpPr>
         <p:spPr>
           <a:xfrm flipV="1">
-            <a:off x="4467039" y="1310409"/>
-            <a:ext cx="0" cy="316800"/>
+            <a:off x="4467039" y="1318361"/>
+            <a:ext cx="6333" cy="310167"/>
           </a:xfrm>
           <a:prstGeom prst="straightConnector1">
             <a:avLst/>
@@ -4289,7 +4366,7 @@
         </p:nvCxnSpPr>
         <p:spPr>
           <a:xfrm flipV="1">
-            <a:off x="8971674" y="3234813"/>
+            <a:off x="8892164" y="3234813"/>
             <a:ext cx="0" cy="417570"/>
           </a:xfrm>
           <a:prstGeom prst="straightConnector1">
@@ -4328,8 +4405,8 @@
         </p:nvCxnSpPr>
         <p:spPr>
           <a:xfrm flipV="1">
-            <a:off x="7853166" y="1760508"/>
-            <a:ext cx="0" cy="367669"/>
+            <a:off x="7697682" y="1760509"/>
+            <a:ext cx="14193" cy="367669"/>
           </a:xfrm>
           <a:prstGeom prst="straightConnector1">
             <a:avLst/>
@@ -4367,8 +4444,8 @@
         </p:nvCxnSpPr>
         <p:spPr>
           <a:xfrm flipV="1">
-            <a:off x="10387666" y="1760508"/>
-            <a:ext cx="0" cy="367669"/>
+            <a:off x="10232474" y="1760508"/>
+            <a:ext cx="14193" cy="367669"/>
           </a:xfrm>
           <a:prstGeom prst="straightConnector1">
             <a:avLst/>
@@ -4406,8 +4483,8 @@
         </p:nvCxnSpPr>
         <p:spPr>
           <a:xfrm flipV="1">
-            <a:off x="5854101" y="2719743"/>
-            <a:ext cx="540000" cy="0"/>
+            <a:off x="5822297" y="2719743"/>
+            <a:ext cx="560614" cy="18731"/>
           </a:xfrm>
           <a:prstGeom prst="straightConnector1">
             <a:avLst/>
@@ -4445,8 +4522,8 @@
         </p:nvSpPr>
         <p:spPr>
           <a:xfrm>
-            <a:off x="950206" y="4151072"/>
-            <a:ext cx="4659616" cy="266700"/>
+            <a:off x="1434127" y="4174925"/>
+            <a:ext cx="4758251" cy="266700"/>
           </a:xfrm>
           <a:prstGeom prst="roundRect">
             <a:avLst/>
@@ -4523,142 +4600,6 @@
                 </a:solidFill>
               </a:rPr>
               <a:t>REST API</a:t>
-            </a:r>
-          </a:p>
-        </p:txBody>
-      </p:sp>
-      <p:sp>
-        <p:nvSpPr>
-          <p:cNvPr id="39" name="Abgerundetes Rechteck 17"/>
-          <p:cNvSpPr/>
-          <p:nvPr/>
-        </p:nvSpPr>
-        <p:spPr>
-          <a:xfrm>
-            <a:off x="7179178" y="4159248"/>
-            <a:ext cx="1296000" cy="866775"/>
-          </a:xfrm>
-          <a:prstGeom prst="roundRect">
-            <a:avLst>
-              <a:gd name="adj" fmla="val 7494"/>
-            </a:avLst>
-          </a:prstGeom>
-        </p:spPr>
-        <p:style>
-          <a:lnRef idx="2">
-            <a:schemeClr val="accent1">
-              <a:shade val="50000"/>
-            </a:schemeClr>
-          </a:lnRef>
-          <a:fillRef idx="1">
-            <a:schemeClr val="accent1"/>
-          </a:fillRef>
-          <a:effectRef idx="0">
-            <a:schemeClr val="accent1"/>
-          </a:effectRef>
-          <a:fontRef idx="minor">
-            <a:schemeClr val="lt1"/>
-          </a:fontRef>
-        </p:style>
-        <p:txBody>
-          <a:bodyPr rtlCol="0" anchor="ctr"/>
-          <a:lstStyle/>
-          <a:p>
-            <a:pPr algn="ctr"/>
-            <a:r>
-              <a:rPr lang="de-DE" sz="1600" dirty="0"/>
-              <a:t>Workflows</a:t>
-            </a:r>
-          </a:p>
-        </p:txBody>
-      </p:sp>
-      <p:sp>
-        <p:nvSpPr>
-          <p:cNvPr id="40" name="Abgerundetes Rechteck 17"/>
-          <p:cNvSpPr/>
-          <p:nvPr/>
-        </p:nvSpPr>
-        <p:spPr>
-          <a:xfrm>
-            <a:off x="8611856" y="4159248"/>
-            <a:ext cx="1296000" cy="866775"/>
-          </a:xfrm>
-          <a:prstGeom prst="roundRect">
-            <a:avLst>
-              <a:gd name="adj" fmla="val 7494"/>
-            </a:avLst>
-          </a:prstGeom>
-        </p:spPr>
-        <p:style>
-          <a:lnRef idx="2">
-            <a:schemeClr val="accent1">
-              <a:shade val="50000"/>
-            </a:schemeClr>
-          </a:lnRef>
-          <a:fillRef idx="1">
-            <a:schemeClr val="accent1"/>
-          </a:fillRef>
-          <a:effectRef idx="0">
-            <a:schemeClr val="accent1"/>
-          </a:effectRef>
-          <a:fontRef idx="minor">
-            <a:schemeClr val="lt1"/>
-          </a:fontRef>
-        </p:style>
-        <p:txBody>
-          <a:bodyPr rtlCol="0" anchor="ctr"/>
-          <a:lstStyle/>
-          <a:p>
-            <a:pPr algn="ctr"/>
-            <a:r>
-              <a:rPr lang="de-DE" sz="1600" dirty="0" err="1"/>
-              <a:t>Scheduling</a:t>
-            </a:r>
-            <a:endParaRPr lang="de-DE" sz="1600" dirty="0"/>
-          </a:p>
-        </p:txBody>
-      </p:sp>
-      <p:sp>
-        <p:nvSpPr>
-          <p:cNvPr id="44" name="Abgerundetes Rechteck 17"/>
-          <p:cNvSpPr/>
-          <p:nvPr/>
-        </p:nvSpPr>
-        <p:spPr>
-          <a:xfrm>
-            <a:off x="10044535" y="4159248"/>
-            <a:ext cx="1296000" cy="866775"/>
-          </a:xfrm>
-          <a:prstGeom prst="roundRect">
-            <a:avLst>
-              <a:gd name="adj" fmla="val 7494"/>
-            </a:avLst>
-          </a:prstGeom>
-        </p:spPr>
-        <p:style>
-          <a:lnRef idx="2">
-            <a:schemeClr val="accent1">
-              <a:shade val="50000"/>
-            </a:schemeClr>
-          </a:lnRef>
-          <a:fillRef idx="1">
-            <a:schemeClr val="accent1"/>
-          </a:fillRef>
-          <a:effectRef idx="0">
-            <a:schemeClr val="accent1"/>
-          </a:effectRef>
-          <a:fontRef idx="minor">
-            <a:schemeClr val="lt1"/>
-          </a:fontRef>
-        </p:style>
-        <p:txBody>
-          <a:bodyPr rtlCol="0" anchor="ctr"/>
-          <a:lstStyle/>
-          <a:p>
-            <a:pPr algn="ctr"/>
-            <a:r>
-              <a:rPr lang="de-DE" sz="1600" dirty="0"/>
-              <a:t>E-Commerce</a:t>
             </a:r>
           </a:p>
         </p:txBody>

</xml_diff>

<commit_message>
fixed #8807 - [Docs] Update Architecture Overview
</commit_message>
<xml_diff>
--- a/doc/Development_Documentation/img/architectural-chart.pptx
+++ b/doc/Development_Documentation/img/architectural-chart.pptx
@@ -112,10 +112,6 @@
 </p:presentation>
 </file>
 
-<file path=ppt/revisionInfo.xml><?xml version="1.0" encoding="utf-8"?>
-<p1510:revInfo xmlns:a="http://schemas.openxmlformats.org/drawingml/2006/main" xmlns:r="http://schemas.openxmlformats.org/officeDocument/2006/relationships" xmlns:p1510="http://schemas.microsoft.com/office/powerpoint/2015/10/main"/>
-</file>
-
 <file path=ppt/slideLayouts/slideLayout1.xml><?xml version="1.0" encoding="utf-8"?>
 <p:sldLayout xmlns:a="http://schemas.openxmlformats.org/drawingml/2006/main" xmlns:r="http://schemas.openxmlformats.org/officeDocument/2006/relationships" xmlns:p="http://schemas.openxmlformats.org/presentationml/2006/main" type="title" preserve="1">
   <p:cSld name="Titelfolie">
@@ -245,7 +241,7 @@
           <a:p>
             <a:fld id="{F4618184-AC6B-4EC8-A593-7F91D186A496}" type="datetimeFigureOut">
               <a:rPr lang="de-DE" smtClean="0"/>
-              <a:t>02.06.2017</a:t>
+              <a:t>21.04.2021</a:t>
             </a:fld>
             <a:endParaRPr lang="de-DE"/>
           </a:p>
@@ -413,7 +409,7 @@
           <a:p>
             <a:fld id="{F4618184-AC6B-4EC8-A593-7F91D186A496}" type="datetimeFigureOut">
               <a:rPr lang="de-DE" smtClean="0"/>
-              <a:t>02.06.2017</a:t>
+              <a:t>21.04.2021</a:t>
             </a:fld>
             <a:endParaRPr lang="de-DE"/>
           </a:p>
@@ -591,7 +587,7 @@
           <a:p>
             <a:fld id="{F4618184-AC6B-4EC8-A593-7F91D186A496}" type="datetimeFigureOut">
               <a:rPr lang="de-DE" smtClean="0"/>
-              <a:t>02.06.2017</a:t>
+              <a:t>21.04.2021</a:t>
             </a:fld>
             <a:endParaRPr lang="de-DE"/>
           </a:p>
@@ -759,7 +755,7 @@
           <a:p>
             <a:fld id="{F4618184-AC6B-4EC8-A593-7F91D186A496}" type="datetimeFigureOut">
               <a:rPr lang="de-DE" smtClean="0"/>
-              <a:t>02.06.2017</a:t>
+              <a:t>21.04.2021</a:t>
             </a:fld>
             <a:endParaRPr lang="de-DE"/>
           </a:p>
@@ -1004,7 +1000,7 @@
           <a:p>
             <a:fld id="{F4618184-AC6B-4EC8-A593-7F91D186A496}" type="datetimeFigureOut">
               <a:rPr lang="de-DE" smtClean="0"/>
-              <a:t>02.06.2017</a:t>
+              <a:t>21.04.2021</a:t>
             </a:fld>
             <a:endParaRPr lang="de-DE"/>
           </a:p>
@@ -1233,7 +1229,7 @@
           <a:p>
             <a:fld id="{F4618184-AC6B-4EC8-A593-7F91D186A496}" type="datetimeFigureOut">
               <a:rPr lang="de-DE" smtClean="0"/>
-              <a:t>02.06.2017</a:t>
+              <a:t>21.04.2021</a:t>
             </a:fld>
             <a:endParaRPr lang="de-DE"/>
           </a:p>
@@ -1597,7 +1593,7 @@
           <a:p>
             <a:fld id="{F4618184-AC6B-4EC8-A593-7F91D186A496}" type="datetimeFigureOut">
               <a:rPr lang="de-DE" smtClean="0"/>
-              <a:t>02.06.2017</a:t>
+              <a:t>21.04.2021</a:t>
             </a:fld>
             <a:endParaRPr lang="de-DE"/>
           </a:p>
@@ -1714,7 +1710,7 @@
           <a:p>
             <a:fld id="{F4618184-AC6B-4EC8-A593-7F91D186A496}" type="datetimeFigureOut">
               <a:rPr lang="de-DE" smtClean="0"/>
-              <a:t>02.06.2017</a:t>
+              <a:t>21.04.2021</a:t>
             </a:fld>
             <a:endParaRPr lang="de-DE"/>
           </a:p>
@@ -1809,7 +1805,7 @@
           <a:p>
             <a:fld id="{F4618184-AC6B-4EC8-A593-7F91D186A496}" type="datetimeFigureOut">
               <a:rPr lang="de-DE" smtClean="0"/>
-              <a:t>02.06.2017</a:t>
+              <a:t>21.04.2021</a:t>
             </a:fld>
             <a:endParaRPr lang="de-DE"/>
           </a:p>
@@ -2084,7 +2080,7 @@
           <a:p>
             <a:fld id="{F4618184-AC6B-4EC8-A593-7F91D186A496}" type="datetimeFigureOut">
               <a:rPr lang="de-DE" smtClean="0"/>
-              <a:t>02.06.2017</a:t>
+              <a:t>21.04.2021</a:t>
             </a:fld>
             <a:endParaRPr lang="de-DE"/>
           </a:p>
@@ -2336,7 +2332,7 @@
           <a:p>
             <a:fld id="{F4618184-AC6B-4EC8-A593-7F91D186A496}" type="datetimeFigureOut">
               <a:rPr lang="de-DE" smtClean="0"/>
-              <a:t>02.06.2017</a:t>
+              <a:t>21.04.2021</a:t>
             </a:fld>
             <a:endParaRPr lang="de-DE"/>
           </a:p>
@@ -2547,7 +2543,7 @@
           <a:p>
             <a:fld id="{F4618184-AC6B-4EC8-A593-7F91D186A496}" type="datetimeFigureOut">
               <a:rPr lang="de-DE" smtClean="0"/>
-              <a:t>02.06.2017</a:t>
+              <a:t>21.04.2021</a:t>
             </a:fld>
             <a:endParaRPr lang="de-DE"/>
           </a:p>
@@ -3249,8 +3245,13 @@
             <a:pPr algn="ctr"/>
             <a:r>
               <a:rPr lang="de-DE" dirty="0"/>
-              <a:t>Filesystem</a:t>
-            </a:r>
+              <a:t>Filesystem / </a:t>
+            </a:r>
+            <a:r>
+              <a:rPr lang="de-DE" dirty="0" err="1"/>
+              <a:t>Flysystem</a:t>
+            </a:r>
+            <a:endParaRPr lang="de-DE" dirty="0"/>
           </a:p>
         </p:txBody>
       </p:sp>
@@ -3422,8 +3423,8 @@
         </p:nvSpPr>
         <p:spPr>
           <a:xfrm>
-            <a:off x="4743967" y="4515476"/>
-            <a:ext cx="1462088" cy="534865"/>
+            <a:off x="4174476" y="4520235"/>
+            <a:ext cx="1303200" cy="534865"/>
           </a:xfrm>
           <a:prstGeom prst="roundRect">
             <a:avLst/>
@@ -3465,8 +3466,8 @@
         </p:nvSpPr>
         <p:spPr>
           <a:xfrm>
-            <a:off x="3094277" y="4515479"/>
-            <a:ext cx="1462088" cy="534865"/>
+            <a:off x="2807238" y="4520235"/>
+            <a:ext cx="1303200" cy="534865"/>
           </a:xfrm>
           <a:prstGeom prst="roundRect">
             <a:avLst/>
@@ -3508,8 +3509,8 @@
         </p:nvSpPr>
         <p:spPr>
           <a:xfrm>
-            <a:off x="1438793" y="4515478"/>
-            <a:ext cx="1462088" cy="534865"/>
+            <a:off x="1438793" y="4520235"/>
+            <a:ext cx="1304407" cy="534865"/>
           </a:xfrm>
           <a:prstGeom prst="roundRect">
             <a:avLst/>
@@ -3552,8 +3553,8 @@
         </p:nvSpPr>
         <p:spPr>
           <a:xfrm>
-            <a:off x="6399451" y="4183567"/>
-            <a:ext cx="1462088" cy="866775"/>
+            <a:off x="7025647" y="4188325"/>
+            <a:ext cx="1303200" cy="866775"/>
           </a:xfrm>
           <a:prstGeom prst="roundRect">
             <a:avLst/>
@@ -3596,8 +3597,8 @@
         </p:nvSpPr>
         <p:spPr>
           <a:xfrm>
-            <a:off x="8049141" y="4188325"/>
-            <a:ext cx="1462088" cy="866775"/>
+            <a:off x="8447531" y="4188325"/>
+            <a:ext cx="1303200" cy="866775"/>
           </a:xfrm>
           <a:prstGeom prst="roundRect">
             <a:avLst/>
@@ -3639,8 +3640,8 @@
         </p:nvSpPr>
         <p:spPr>
           <a:xfrm>
-            <a:off x="9710737" y="4183566"/>
-            <a:ext cx="1462088" cy="866775"/>
+            <a:off x="9869414" y="4188325"/>
+            <a:ext cx="1303200" cy="866775"/>
           </a:xfrm>
           <a:prstGeom prst="roundRect">
             <a:avLst/>
@@ -3906,7 +3907,7 @@
                   <a:schemeClr val="accent5"/>
                 </a:solidFill>
               </a:rPr>
-              <a:t>MVC</a:t>
+              <a:t>MVC &amp; APIs</a:t>
             </a:r>
           </a:p>
         </p:txBody>
@@ -4522,8 +4523,8 @@
         </p:nvSpPr>
         <p:spPr>
           <a:xfrm>
-            <a:off x="1434127" y="4174925"/>
-            <a:ext cx="4758251" cy="266700"/>
+            <a:off x="1434127" y="4188325"/>
+            <a:ext cx="4043549" cy="266700"/>
           </a:xfrm>
           <a:prstGeom prst="roundRect">
             <a:avLst/>
@@ -4594,12 +4595,76 @@
           <a:p>
             <a:pPr algn="ctr"/>
             <a:r>
+              <a:rPr lang="de-DE" dirty="0" err="1">
+                <a:solidFill>
+                  <a:schemeClr val="bg1"/>
+                </a:solidFill>
+              </a:rPr>
+              <a:t>Datahub</a:t>
+            </a:r>
+            <a:br>
               <a:rPr lang="de-DE" dirty="0">
                 <a:solidFill>
                   <a:schemeClr val="bg1"/>
                 </a:solidFill>
               </a:rPr>
-              <a:t>REST API</a:t>
+            </a:br>
+            <a:r>
+              <a:rPr lang="de-DE" dirty="0">
+                <a:solidFill>
+                  <a:schemeClr val="bg1"/>
+                </a:solidFill>
+              </a:rPr>
+              <a:t>APIs</a:t>
+            </a:r>
+          </a:p>
+        </p:txBody>
+      </p:sp>
+      <p:sp>
+        <p:nvSpPr>
+          <p:cNvPr id="39" name="Abgerundetes Rechteck 17">
+            <a:extLst>
+              <a:ext uri="{FF2B5EF4-FFF2-40B4-BE49-F238E27FC236}">
+                <a16:creationId xmlns:a16="http://schemas.microsoft.com/office/drawing/2014/main" id="{F0F31302-9630-44FD-BBC5-1C551C65A2CD}"/>
+              </a:ext>
+            </a:extLst>
+          </p:cNvPr>
+          <p:cNvSpPr/>
+          <p:nvPr/>
+        </p:nvSpPr>
+        <p:spPr>
+          <a:xfrm>
+            <a:off x="5603763" y="4188325"/>
+            <a:ext cx="1303200" cy="866775"/>
+          </a:xfrm>
+          <a:prstGeom prst="roundRect">
+            <a:avLst/>
+          </a:prstGeom>
+        </p:spPr>
+        <p:style>
+          <a:lnRef idx="2">
+            <a:schemeClr val="accent1">
+              <a:shade val="50000"/>
+            </a:schemeClr>
+          </a:lnRef>
+          <a:fillRef idx="1">
+            <a:schemeClr val="accent1"/>
+          </a:fillRef>
+          <a:effectRef idx="0">
+            <a:schemeClr val="accent1"/>
+          </a:effectRef>
+          <a:fontRef idx="minor">
+            <a:schemeClr val="lt1"/>
+          </a:fontRef>
+        </p:style>
+        <p:txBody>
+          <a:bodyPr rtlCol="0" anchor="ctr"/>
+          <a:lstStyle/>
+          <a:p>
+            <a:pPr algn="ctr"/>
+            <a:r>
+              <a:rPr lang="de-DE" dirty="0"/>
+              <a:t>Commerce</a:t>
             </a:r>
           </a:p>
         </p:txBody>

</xml_diff>